<commit_message>
triying out something new
</commit_message>
<xml_diff>
--- a/New Microsoft PowerPoint Presentation.pptx
+++ b/New Microsoft PowerPoint Presentation.pptx
@@ -6,6 +6,7 @@
   </p:sldMasterIdLst>
   <p:sldIdLst>
     <p:sldId id="256" r:id="rId2"/>
+    <p:sldId id="257" r:id="rId3"/>
   </p:sldIdLst>
   <p:sldSz cx="12192000" cy="6858000"/>
   <p:notesSz cx="6858000" cy="9144000"/>
@@ -104,6 +105,11 @@
       </a:defRPr>
     </a:lvl9pPr>
   </p:defaultTextStyle>
+  <p:extLst>
+    <p:ext uri="{EFAFB233-063F-42B5-8137-9DF3F51BA10A}">
+      <p15:sldGuideLst xmlns:p15="http://schemas.microsoft.com/office/powerpoint/2012/main"/>
+    </p:ext>
+  </p:extLst>
 </p:presentation>
 </file>
 
@@ -112,22 +118,37 @@
   <pc:docChgLst>
     <pc:chgData name="trashav sharma" userId="3f23e91bf6c3db90" providerId="LiveId" clId="{742CB90B-3718-4B52-B1AF-54E304DBC4E1}"/>
     <pc:docChg chg="addSld modSld">
-      <pc:chgData name="trashav sharma" userId="3f23e91bf6c3db90" providerId="LiveId" clId="{742CB90B-3718-4B52-B1AF-54E304DBC4E1}" dt="2024-08-12T18:36:09.213" v="6" actId="20577"/>
+      <pc:chgData name="trashav sharma" userId="3f23e91bf6c3db90" providerId="LiveId" clId="{742CB90B-3718-4B52-B1AF-54E304DBC4E1}" dt="2024-08-12T18:39:59.932" v="23" actId="20577"/>
       <pc:docMkLst>
         <pc:docMk/>
       </pc:docMkLst>
       <pc:sldChg chg="modSp new mod">
-        <pc:chgData name="trashav sharma" userId="3f23e91bf6c3db90" providerId="LiveId" clId="{742CB90B-3718-4B52-B1AF-54E304DBC4E1}" dt="2024-08-12T18:36:09.213" v="6" actId="20577"/>
+        <pc:chgData name="trashav sharma" userId="3f23e91bf6c3db90" providerId="LiveId" clId="{742CB90B-3718-4B52-B1AF-54E304DBC4E1}" dt="2024-08-12T18:39:48.153" v="11" actId="20577"/>
         <pc:sldMkLst>
           <pc:docMk/>
           <pc:sldMk cId="3595133575" sldId="256"/>
         </pc:sldMkLst>
         <pc:spChg chg="mod">
-          <ac:chgData name="trashav sharma" userId="3f23e91bf6c3db90" providerId="LiveId" clId="{742CB90B-3718-4B52-B1AF-54E304DBC4E1}" dt="2024-08-12T18:36:09.213" v="6" actId="20577"/>
+          <ac:chgData name="trashav sharma" userId="3f23e91bf6c3db90" providerId="LiveId" clId="{742CB90B-3718-4B52-B1AF-54E304DBC4E1}" dt="2024-08-12T18:39:48.153" v="11" actId="20577"/>
           <ac:spMkLst>
             <pc:docMk/>
             <pc:sldMk cId="3595133575" sldId="256"/>
             <ac:spMk id="2" creationId="{41C31139-E9DE-A092-8873-ED53D6FE9F6C}"/>
+          </ac:spMkLst>
+        </pc:spChg>
+      </pc:sldChg>
+      <pc:sldChg chg="modSp new mod">
+        <pc:chgData name="trashav sharma" userId="3f23e91bf6c3db90" providerId="LiveId" clId="{742CB90B-3718-4B52-B1AF-54E304DBC4E1}" dt="2024-08-12T18:39:59.932" v="23" actId="20577"/>
+        <pc:sldMkLst>
+          <pc:docMk/>
+          <pc:sldMk cId="1418057771" sldId="257"/>
+        </pc:sldMkLst>
+        <pc:spChg chg="mod">
+          <ac:chgData name="trashav sharma" userId="3f23e91bf6c3db90" providerId="LiveId" clId="{742CB90B-3718-4B52-B1AF-54E304DBC4E1}" dt="2024-08-12T18:39:59.932" v="23" actId="20577"/>
+          <ac:spMkLst>
+            <pc:docMk/>
+            <pc:sldMk cId="1418057771" sldId="257"/>
+            <ac:spMk id="2" creationId="{4DEEA5D3-8A96-7DE2-5B7D-D6F92A00B0C8}"/>
           </ac:spMkLst>
         </pc:spChg>
       </pc:sldChg>
@@ -3387,16 +3408,21 @@
             <p:ph type="ctrTitle"/>
           </p:nvPr>
         </p:nvSpPr>
-        <p:spPr/>
-        <p:txBody>
-          <a:bodyPr/>
-          <a:lstStyle/>
-          <a:p>
-            <a:r>
-              <a:rPr lang="en-US"/>
+        <p:spPr>
+          <a:xfrm>
+            <a:off x="1514168" y="1122363"/>
+            <a:ext cx="9144000" cy="2387600"/>
+          </a:xfrm>
+        </p:spPr>
+        <p:txBody>
+          <a:bodyPr/>
+          <a:lstStyle/>
+          <a:p>
+            <a:r>
+              <a:rPr lang="en-US" dirty="0" err="1"/>
               <a:t>hahaha</a:t>
             </a:r>
-            <a:endParaRPr lang="en-IN"/>
+            <a:endParaRPr lang="en-IN" dirty="0"/>
           </a:p>
         </p:txBody>
       </p:sp>
@@ -3429,6 +3455,90 @@
     <p:extLst>
       <p:ext uri="{BB962C8B-B14F-4D97-AF65-F5344CB8AC3E}">
         <p14:creationId xmlns:p14="http://schemas.microsoft.com/office/powerpoint/2010/main" val="3595133575"/>
+      </p:ext>
+    </p:extLst>
+  </p:cSld>
+  <p:clrMapOvr>
+    <a:masterClrMapping/>
+  </p:clrMapOvr>
+</p:sld>
+</file>
+
+<file path=ppt/slides/slide2.xml><?xml version="1.0" encoding="utf-8"?>
+<p:sld xmlns:a="http://schemas.openxmlformats.org/drawingml/2006/main" xmlns:r="http://schemas.openxmlformats.org/officeDocument/2006/relationships" xmlns:p="http://schemas.openxmlformats.org/presentationml/2006/main">
+  <p:cSld>
+    <p:spTree>
+      <p:nvGrpSpPr>
+        <p:cNvPr id="1" name=""/>
+        <p:cNvGrpSpPr/>
+        <p:nvPr/>
+      </p:nvGrpSpPr>
+      <p:grpSpPr>
+        <a:xfrm>
+          <a:off x="0" y="0"/>
+          <a:ext cx="0" cy="0"/>
+          <a:chOff x="0" y="0"/>
+          <a:chExt cx="0" cy="0"/>
+        </a:xfrm>
+      </p:grpSpPr>
+      <p:sp>
+        <p:nvSpPr>
+          <p:cNvPr id="2" name="Title 1">
+            <a:extLst>
+              <a:ext uri="{FF2B5EF4-FFF2-40B4-BE49-F238E27FC236}">
+                <a16:creationId xmlns:a16="http://schemas.microsoft.com/office/drawing/2014/main" id="{4DEEA5D3-8A96-7DE2-5B7D-D6F92A00B0C8}"/>
+              </a:ext>
+            </a:extLst>
+          </p:cNvPr>
+          <p:cNvSpPr>
+            <a:spLocks noGrp="1"/>
+          </p:cNvSpPr>
+          <p:nvPr>
+            <p:ph type="title"/>
+          </p:nvPr>
+        </p:nvSpPr>
+        <p:spPr/>
+        <p:txBody>
+          <a:bodyPr/>
+          <a:lstStyle/>
+          <a:p>
+            <a:r>
+              <a:rPr lang="en-US"/>
+              <a:t>haaaaaaaaaa</a:t>
+            </a:r>
+            <a:endParaRPr lang="en-IN"/>
+          </a:p>
+        </p:txBody>
+      </p:sp>
+      <p:sp>
+        <p:nvSpPr>
+          <p:cNvPr id="3" name="Content Placeholder 2">
+            <a:extLst>
+              <a:ext uri="{FF2B5EF4-FFF2-40B4-BE49-F238E27FC236}">
+                <a16:creationId xmlns:a16="http://schemas.microsoft.com/office/drawing/2014/main" id="{51314119-B40D-591A-3BBB-79BB5708121E}"/>
+              </a:ext>
+            </a:extLst>
+          </p:cNvPr>
+          <p:cNvSpPr>
+            <a:spLocks noGrp="1"/>
+          </p:cNvSpPr>
+          <p:nvPr>
+            <p:ph idx="1"/>
+          </p:nvPr>
+        </p:nvSpPr>
+        <p:spPr/>
+        <p:txBody>
+          <a:bodyPr/>
+          <a:lstStyle/>
+          <a:p>
+            <a:endParaRPr lang="en-IN"/>
+          </a:p>
+        </p:txBody>
+      </p:sp>
+    </p:spTree>
+    <p:extLst>
+      <p:ext uri="{BB962C8B-B14F-4D97-AF65-F5344CB8AC3E}">
+        <p14:creationId xmlns:p14="http://schemas.microsoft.com/office/powerpoint/2010/main" val="1418057771"/>
       </p:ext>
     </p:extLst>
   </p:cSld>

</xml_diff>